<commit_message>
Updated For Loop Resource
</commit_message>
<xml_diff>
--- a/For Loop Resource.pptx
+++ b/For Loop Resource.pptx
@@ -10,8 +10,8 @@
     <p:sldId id="258" r:id="rId4"/>
     <p:sldId id="259" r:id="rId5"/>
     <p:sldId id="260" r:id="rId6"/>
-    <p:sldId id="262" r:id="rId7"/>
-    <p:sldId id="261" r:id="rId8"/>
+    <p:sldId id="261" r:id="rId7"/>
+    <p:sldId id="262" r:id="rId8"/>
   </p:sldIdLst>
   <p:sldSz cx="9144000" cy="6858000" type="screen4x3"/>
   <p:notesSz cx="6858000" cy="9144000"/>
@@ -14676,9 +14676,14 @@
           <a:lstStyle/>
           <a:p>
             <a:r>
+              <a:rPr lang="en-US" smtClean="0"/>
+              <a:t>Repeating statements a </a:t>
+            </a:r>
+            <a:r>
               <a:rPr lang="en-US" dirty="0" smtClean="0"/>
-              <a:t>Repeating a sequence of steps while not at the end of the conditional</a:t>
+              <a:t>certain number of times </a:t>
             </a:r>
+            <a:endParaRPr lang="en-US" dirty="0" smtClean="0"/>
           </a:p>
           <a:p>
             <a:endParaRPr lang="en-US" dirty="0" smtClean="0"/>
@@ -14813,11 +14818,7 @@
           <a:p>
             <a:r>
               <a:rPr lang="en-US" dirty="0" smtClean="0"/>
-              <a:t>Imagine you have a birthday </a:t>
-            </a:r>
-            <a:r>
-              <a:rPr lang="en-US" dirty="0" smtClean="0"/>
-              <a:t>cake… </a:t>
+              <a:t>Imagine you have a birthday cake… </a:t>
             </a:r>
             <a:endParaRPr lang="en-US" dirty="0"/>
           </a:p>
@@ -14889,58 +14890,13 @@
           <a:p>
             <a:r>
               <a:rPr lang="en-US" dirty="0" smtClean="0"/>
-              <a:t>So, </a:t>
+              <a:t>So, for each slice of cake, a person at your party gets a slice.</a:t>
             </a:r>
-            <a:r>
-              <a:rPr lang="en-US" b="1" dirty="0" smtClean="0">
-                <a:solidFill>
-                  <a:srgbClr val="00B050"/>
-                </a:solidFill>
-              </a:rPr>
-              <a:t>for</a:t>
-            </a:r>
-            <a:r>
-              <a:rPr lang="en-US" dirty="0" smtClean="0">
-                <a:solidFill>
-                  <a:srgbClr val="00B050"/>
-                </a:solidFill>
-              </a:rPr>
-              <a:t> each slice of cake</a:t>
-            </a:r>
-            <a:r>
-              <a:rPr lang="en-US" dirty="0" smtClean="0"/>
-              <a:t>, </a:t>
-            </a:r>
-            <a:r>
-              <a:rPr lang="en-US" dirty="0" smtClean="0">
-                <a:solidFill>
-                  <a:srgbClr val="FFC000"/>
-                </a:solidFill>
-              </a:rPr>
-              <a:t>a person at your party gets a </a:t>
-            </a:r>
-            <a:r>
-              <a:rPr lang="en-US" dirty="0" smtClean="0">
-                <a:solidFill>
-                  <a:srgbClr val="FFC000"/>
-                </a:solidFill>
-              </a:rPr>
-              <a:t>slice.</a:t>
-            </a:r>
-            <a:endParaRPr lang="en-US" dirty="0" smtClean="0">
-              <a:solidFill>
-                <a:srgbClr val="FFC000"/>
-              </a:solidFill>
-            </a:endParaRPr>
           </a:p>
           <a:p>
             <a:r>
               <a:rPr lang="en-US" dirty="0" smtClean="0"/>
-              <a:t>Until there are no slices </a:t>
-            </a:r>
-            <a:r>
-              <a:rPr lang="en-US" dirty="0" smtClean="0"/>
-              <a:t>left</a:t>
+              <a:t>Until there are no slices left</a:t>
             </a:r>
             <a:endParaRPr lang="en-US" dirty="0"/>
           </a:p>
@@ -15061,20 +15017,12 @@
           <a:lstStyle/>
           <a:p>
             <a:r>
-              <a:rPr lang="en-US" b="1" dirty="0" smtClean="0">
-                <a:solidFill>
-                  <a:srgbClr val="00B050"/>
-                </a:solidFill>
-              </a:rPr>
-              <a:t>for</a:t>
-            </a:r>
-            <a:r>
               <a:rPr lang="en-US" dirty="0" smtClean="0">
                 <a:solidFill>
                   <a:srgbClr val="00B050"/>
                 </a:solidFill>
               </a:rPr>
-              <a:t> each slice of cake</a:t>
+              <a:t>for each slice of cake</a:t>
             </a:r>
             <a:r>
               <a:rPr lang="en-US" dirty="0" smtClean="0"/>
@@ -15086,25 +15034,15 @@
                   <a:srgbClr val="FFC000"/>
                 </a:solidFill>
               </a:rPr>
-              <a:t>a person at your party gets a </a:t>
-            </a:r>
-            <a:r>
-              <a:rPr lang="en-US" dirty="0" smtClean="0">
-                <a:solidFill>
-                  <a:srgbClr val="FFC000"/>
-                </a:solidFill>
-              </a:rPr>
-              <a:t>slice</a:t>
+              <a:t>a person at your party gets a slice</a:t>
             </a:r>
           </a:p>
           <a:p>
-            <a:endParaRPr lang="en-US" dirty="0">
-              <a:solidFill>
-                <a:schemeClr val="accent6">
-                  <a:lumMod val="75000"/>
-                </a:schemeClr>
-              </a:solidFill>
-            </a:endParaRPr>
+            <a:r>
+              <a:rPr lang="en-US" dirty="0" smtClean="0"/>
+              <a:t>Python Code Example:</a:t>
+            </a:r>
+            <a:endParaRPr lang="en-US" dirty="0"/>
           </a:p>
           <a:p>
             <a:pPr marL="0" indent="0">
@@ -15112,11 +15050,7 @@
             </a:pPr>
             <a:r>
               <a:rPr lang="en-US" dirty="0" smtClean="0"/>
-              <a:t>Cake = </a:t>
-            </a:r>
-            <a:r>
-              <a:rPr lang="en-US" dirty="0" smtClean="0"/>
-              <a:t>24</a:t>
+              <a:t>Cake = 24</a:t>
             </a:r>
           </a:p>
           <a:p>
@@ -15186,11 +15120,6 @@
               </a:rPr>
               <a:t> 				  repeats 24 times</a:t>
             </a:r>
-            <a:endParaRPr lang="en-US" dirty="0" smtClean="0">
-              <a:solidFill>
-                <a:srgbClr val="FF0000"/>
-              </a:solidFill>
-            </a:endParaRPr>
           </a:p>
           <a:p>
             <a:pPr marL="0" indent="0">
@@ -15262,6 +15191,160 @@
 </file>
 
 <file path=ppt/slides/slide6.xml><?xml version="1.0" encoding="utf-8"?>
+<p:sld xmlns:a="http://schemas.openxmlformats.org/drawingml/2006/main" xmlns:r="http://schemas.openxmlformats.org/officeDocument/2006/relationships" xmlns:p="http://schemas.openxmlformats.org/presentationml/2006/main">
+  <p:cSld>
+    <p:spTree>
+      <p:nvGrpSpPr>
+        <p:cNvPr id="1" name=""/>
+        <p:cNvGrpSpPr/>
+        <p:nvPr/>
+      </p:nvGrpSpPr>
+      <p:grpSpPr>
+        <a:xfrm>
+          <a:off x="0" y="0"/>
+          <a:ext cx="0" cy="0"/>
+          <a:chOff x="0" y="0"/>
+          <a:chExt cx="0" cy="0"/>
+        </a:xfrm>
+      </p:grpSpPr>
+      <p:sp>
+        <p:nvSpPr>
+          <p:cNvPr id="3" name="Content Placeholder 2"/>
+          <p:cNvSpPr>
+            <a:spLocks noGrp="1"/>
+          </p:cNvSpPr>
+          <p:nvPr>
+            <p:ph idx="1"/>
+          </p:nvPr>
+        </p:nvSpPr>
+        <p:spPr>
+          <a:xfrm>
+            <a:off x="838200" y="2743200"/>
+            <a:ext cx="7408333" cy="3450696"/>
+          </a:xfrm>
+        </p:spPr>
+        <p:txBody>
+          <a:bodyPr/>
+          <a:lstStyle/>
+          <a:p>
+            <a:r>
+              <a:rPr lang="en-US" dirty="0" smtClean="0"/>
+              <a:t>For repeating a statement or group of statements a certain number of times</a:t>
+            </a:r>
+            <a:r>
+              <a:rPr lang="en-US" dirty="0"/>
+              <a:t>:</a:t>
+            </a:r>
+            <a:endParaRPr lang="en-US" dirty="0" smtClean="0"/>
+          </a:p>
+          <a:p>
+            <a:pPr marL="301943" lvl="1" indent="0">
+              <a:buNone/>
+            </a:pPr>
+            <a:r>
+              <a:rPr lang="en-US" b="1" dirty="0" smtClean="0"/>
+              <a:t>for</a:t>
+            </a:r>
+            <a:r>
+              <a:rPr lang="en-US" dirty="0" smtClean="0"/>
+              <a:t> x </a:t>
+            </a:r>
+            <a:r>
+              <a:rPr lang="en-US" b="1" dirty="0" smtClean="0"/>
+              <a:t>in </a:t>
+            </a:r>
+            <a:r>
+              <a:rPr lang="en-US" dirty="0" smtClean="0"/>
+              <a:t>range(0,3):     </a:t>
+            </a:r>
+          </a:p>
+          <a:p>
+            <a:pPr marL="627063" lvl="2" indent="0">
+              <a:buNone/>
+            </a:pPr>
+            <a:r>
+              <a:rPr lang="en-US" dirty="0" smtClean="0"/>
+              <a:t>y = x + 1	# these 2 statements are repeated 3 times</a:t>
+            </a:r>
+          </a:p>
+          <a:p>
+            <a:pPr marL="627063" lvl="2" indent="0">
+              <a:buNone/>
+            </a:pPr>
+            <a:r>
+              <a:rPr lang="en-US" dirty="0" smtClean="0"/>
+              <a:t>print(y)</a:t>
+            </a:r>
+          </a:p>
+          <a:p>
+            <a:pPr lvl="1"/>
+            <a:r>
+              <a:rPr lang="en-US" dirty="0" smtClean="0"/>
+              <a:t>What would this print?</a:t>
+            </a:r>
+          </a:p>
+          <a:p>
+            <a:r>
+              <a:rPr lang="en-US" dirty="0" smtClean="0"/>
+              <a:t>Iterating through a collection of items in a list. This is the same idea as we saw with the cake example.</a:t>
+            </a:r>
+          </a:p>
+        </p:txBody>
+      </p:sp>
+      <p:sp>
+        <p:nvSpPr>
+          <p:cNvPr id="2" name="Title 1"/>
+          <p:cNvSpPr>
+            <a:spLocks noGrp="1"/>
+          </p:cNvSpPr>
+          <p:nvPr>
+            <p:ph type="title"/>
+          </p:nvPr>
+        </p:nvSpPr>
+        <p:spPr/>
+        <p:txBody>
+          <a:bodyPr>
+            <a:normAutofit/>
+          </a:bodyPr>
+          <a:lstStyle/>
+          <a:p>
+            <a:r>
+              <a:rPr lang="en-US" dirty="0" smtClean="0"/>
+              <a:t>When are </a:t>
+            </a:r>
+            <a:r>
+              <a:rPr lang="en-US" dirty="0" smtClean="0"/>
+              <a:t>For-Loops </a:t>
+            </a:r>
+            <a:r>
+              <a:rPr lang="en-US" dirty="0" smtClean="0"/>
+              <a:t>useful?</a:t>
+            </a:r>
+            <a:endParaRPr lang="en-US" dirty="0"/>
+          </a:p>
+        </p:txBody>
+      </p:sp>
+    </p:spTree>
+    <p:extLst>
+      <p:ext uri="{BB962C8B-B14F-4D97-AF65-F5344CB8AC3E}">
+        <p14:creationId xmlns:p14="http://schemas.microsoft.com/office/powerpoint/2010/main" val="557062118"/>
+      </p:ext>
+    </p:extLst>
+  </p:cSld>
+  <p:clrMapOvr>
+    <a:masterClrMapping/>
+  </p:clrMapOvr>
+  <p:timing>
+    <p:tnLst>
+      <p:par>
+        <p:cTn id="1" dur="indefinite" restart="never" nodeType="tmRoot"/>
+      </p:par>
+    </p:tnLst>
+  </p:timing>
+</p:sld>
+</file>
+
+<file path=ppt/slides/slide7.xml><?xml version="1.0" encoding="utf-8"?>
 <p:sld xmlns:a="http://schemas.openxmlformats.org/drawingml/2006/main" xmlns:r="http://schemas.openxmlformats.org/officeDocument/2006/relationships" xmlns:p="http://schemas.openxmlformats.org/presentationml/2006/main">
   <p:cSld>
     <p:spTree>
@@ -15386,162 +15469,6 @@
     <p:extLst>
       <p:ext uri="{BB962C8B-B14F-4D97-AF65-F5344CB8AC3E}">
         <p14:creationId xmlns:p14="http://schemas.microsoft.com/office/powerpoint/2010/main" val="3030687340"/>
-      </p:ext>
-    </p:extLst>
-  </p:cSld>
-  <p:clrMapOvr>
-    <a:masterClrMapping/>
-  </p:clrMapOvr>
-  <p:timing>
-    <p:tnLst>
-      <p:par>
-        <p:cTn id="1" dur="indefinite" restart="never" nodeType="tmRoot"/>
-      </p:par>
-    </p:tnLst>
-  </p:timing>
-</p:sld>
-</file>
-
-<file path=ppt/slides/slide7.xml><?xml version="1.0" encoding="utf-8"?>
-<p:sld xmlns:a="http://schemas.openxmlformats.org/drawingml/2006/main" xmlns:r="http://schemas.openxmlformats.org/officeDocument/2006/relationships" xmlns:p="http://schemas.openxmlformats.org/presentationml/2006/main">
-  <p:cSld>
-    <p:spTree>
-      <p:nvGrpSpPr>
-        <p:cNvPr id="1" name=""/>
-        <p:cNvGrpSpPr/>
-        <p:nvPr/>
-      </p:nvGrpSpPr>
-      <p:grpSpPr>
-        <a:xfrm>
-          <a:off x="0" y="0"/>
-          <a:ext cx="0" cy="0"/>
-          <a:chOff x="0" y="0"/>
-          <a:chExt cx="0" cy="0"/>
-        </a:xfrm>
-      </p:grpSpPr>
-      <p:sp>
-        <p:nvSpPr>
-          <p:cNvPr id="3" name="Content Placeholder 2"/>
-          <p:cNvSpPr>
-            <a:spLocks noGrp="1"/>
-          </p:cNvSpPr>
-          <p:nvPr>
-            <p:ph idx="1"/>
-          </p:nvPr>
-        </p:nvSpPr>
-        <p:spPr>
-          <a:xfrm>
-            <a:off x="838200" y="2743200"/>
-            <a:ext cx="7408333" cy="3450696"/>
-          </a:xfrm>
-        </p:spPr>
-        <p:txBody>
-          <a:bodyPr/>
-          <a:lstStyle/>
-          <a:p>
-            <a:r>
-              <a:rPr lang="en-US" dirty="0" smtClean="0"/>
-              <a:t>For repeating a statement or group of statements a certain number of times</a:t>
-            </a:r>
-            <a:r>
-              <a:rPr lang="en-US" dirty="0"/>
-              <a:t>:</a:t>
-            </a:r>
-            <a:endParaRPr lang="en-US" dirty="0" smtClean="0"/>
-          </a:p>
-          <a:p>
-            <a:pPr marL="301943" lvl="1" indent="0">
-              <a:buNone/>
-            </a:pPr>
-            <a:r>
-              <a:rPr lang="en-US" b="1" dirty="0" smtClean="0"/>
-              <a:t>for</a:t>
-            </a:r>
-            <a:r>
-              <a:rPr lang="en-US" dirty="0" smtClean="0"/>
-              <a:t> x </a:t>
-            </a:r>
-            <a:r>
-              <a:rPr lang="en-US" b="1" dirty="0" smtClean="0"/>
-              <a:t>in </a:t>
-            </a:r>
-            <a:r>
-              <a:rPr lang="en-US" dirty="0" smtClean="0"/>
-              <a:t>range(0,3):     </a:t>
-            </a:r>
-          </a:p>
-          <a:p>
-            <a:pPr marL="627063" lvl="2" indent="0">
-              <a:buNone/>
-            </a:pPr>
-            <a:r>
-              <a:rPr lang="en-US" dirty="0" smtClean="0"/>
-              <a:t>y = x + 1	# these 2 statements are repeated 3 times</a:t>
-            </a:r>
-          </a:p>
-          <a:p>
-            <a:pPr marL="627063" lvl="2" indent="0">
-              <a:buNone/>
-            </a:pPr>
-            <a:r>
-              <a:rPr lang="en-US" dirty="0" smtClean="0"/>
-              <a:t>print(y)</a:t>
-            </a:r>
-            <a:endParaRPr lang="en-US" dirty="0" smtClean="0"/>
-          </a:p>
-          <a:p>
-            <a:pPr lvl="1"/>
-            <a:r>
-              <a:rPr lang="en-US" dirty="0" smtClean="0"/>
-              <a:t>What would this print?</a:t>
-            </a:r>
-            <a:endParaRPr lang="en-US" dirty="0" smtClean="0"/>
-          </a:p>
-          <a:p>
-            <a:r>
-              <a:rPr lang="en-US" dirty="0" smtClean="0"/>
-              <a:t>Iterating through a collection of items in a list. This is the same idea as we saw with the cake example.</a:t>
-            </a:r>
-          </a:p>
-        </p:txBody>
-      </p:sp>
-      <p:sp>
-        <p:nvSpPr>
-          <p:cNvPr id="2" name="Title 1"/>
-          <p:cNvSpPr>
-            <a:spLocks noGrp="1"/>
-          </p:cNvSpPr>
-          <p:nvPr>
-            <p:ph type="title"/>
-          </p:nvPr>
-        </p:nvSpPr>
-        <p:spPr/>
-        <p:txBody>
-          <a:bodyPr>
-            <a:normAutofit/>
-          </a:bodyPr>
-          <a:lstStyle/>
-          <a:p>
-            <a:r>
-              <a:rPr lang="en-US" dirty="0" smtClean="0"/>
-              <a:t>When </a:t>
-            </a:r>
-            <a:r>
-              <a:rPr lang="en-US" dirty="0" smtClean="0"/>
-              <a:t>are For </a:t>
-            </a:r>
-            <a:r>
-              <a:rPr lang="en-US" dirty="0" smtClean="0"/>
-              <a:t>Loops useful?</a:t>
-            </a:r>
-            <a:endParaRPr lang="en-US" dirty="0"/>
-          </a:p>
-        </p:txBody>
-      </p:sp>
-    </p:spTree>
-    <p:extLst>
-      <p:ext uri="{BB962C8B-B14F-4D97-AF65-F5344CB8AC3E}">
-        <p14:creationId xmlns:p14="http://schemas.microsoft.com/office/powerpoint/2010/main" val="557062118"/>
       </p:ext>
     </p:extLst>
   </p:cSld>

</xml_diff>